<commit_message>
Reformat Agile Business Analysis
</commit_message>
<xml_diff>
--- a/Agile Business Analysis/00-Opening.pptx
+++ b/Agile Business Analysis/00-Opening.pptx
@@ -163,6 +163,36 @@
       </a:defRPr>
     </a:lvl9pPr>
   </p:defaultTextStyle>
+  <p:extLst>
+    <p:ext uri="{EFAFB233-063F-42B5-8137-9DF3F51BA10A}">
+      <p15:sldGuideLst xmlns:p15="http://schemas.microsoft.com/office/powerpoint/2012/main">
+        <p15:guide id="1" orient="horz" pos="2160">
+          <p15:clr>
+            <a:srgbClr val="A4A3A4"/>
+          </p15:clr>
+        </p15:guide>
+        <p15:guide id="2" pos="2880">
+          <p15:clr>
+            <a:srgbClr val="A4A3A4"/>
+          </p15:clr>
+        </p15:guide>
+      </p15:sldGuideLst>
+    </p:ext>
+    <p:ext uri="{2D200454-40CA-4A62-9FC3-DE9A4176ACB9}">
+      <p15:notesGuideLst xmlns:p15="http://schemas.microsoft.com/office/powerpoint/2012/main">
+        <p15:guide id="1" orient="horz" pos="2921">
+          <p15:clr>
+            <a:srgbClr val="A4A3A4"/>
+          </p15:clr>
+        </p15:guide>
+        <p15:guide id="2" pos="2200">
+          <p15:clr>
+            <a:srgbClr val="A4A3A4"/>
+          </p15:clr>
+        </p15:guide>
+      </p15:notesGuideLst>
+    </p:ext>
+  </p:extLst>
 </p:presentation>
 </file>
 
@@ -307,7 +337,7 @@
             <a:fld id="{3645A85B-5EE2-224D-892B-EBDEE738041D}" type="datetime1">
               <a:rPr lang="en-US"/>
               <a:pPr/>
-              <a:t>9/23/15</a:t>
+              <a:t>10/5/15</a:t>
             </a:fld>
             <a:endParaRPr lang="en-US"/>
           </a:p>
@@ -550,7 +580,7 @@
             <a:fld id="{357A0049-9727-1C49-9F90-B954D42273FA}" type="datetime1">
               <a:rPr lang="en-US"/>
               <a:pPr/>
-              <a:t>9/23/15</a:t>
+              <a:t>10/5/15</a:t>
             </a:fld>
             <a:endParaRPr lang="en-US"/>
           </a:p>
@@ -1126,6 +1156,11 @@
         </p:txBody>
       </p:sp>
     </p:spTree>
+    <p:extLst>
+      <p:ext uri="{BB962C8B-B14F-4D97-AF65-F5344CB8AC3E}">
+        <p14:creationId xmlns:p14="http://schemas.microsoft.com/office/powerpoint/2010/main" val="1568101701"/>
+      </p:ext>
+    </p:extLst>
   </p:cSld>
   <p:clrMapOvr>
     <a:masterClrMapping/>
@@ -1254,6 +1289,11 @@
         </p:txBody>
       </p:sp>
     </p:spTree>
+    <p:extLst>
+      <p:ext uri="{BB962C8B-B14F-4D97-AF65-F5344CB8AC3E}">
+        <p14:creationId xmlns:p14="http://schemas.microsoft.com/office/powerpoint/2010/main" val="1165972723"/>
+      </p:ext>
+    </p:extLst>
   </p:cSld>
   <p:clrMapOvr>
     <a:masterClrMapping/>
@@ -1377,6 +1417,11 @@
         </p:txBody>
       </p:sp>
     </p:spTree>
+    <p:extLst>
+      <p:ext uri="{BB962C8B-B14F-4D97-AF65-F5344CB8AC3E}">
+        <p14:creationId xmlns:p14="http://schemas.microsoft.com/office/powerpoint/2010/main" val="715276586"/>
+      </p:ext>
+    </p:extLst>
   </p:cSld>
   <p:clrMapOvr>
     <a:masterClrMapping/>
@@ -1493,13 +1538,8 @@
             </a:pPr>
             <a:r>
               <a:rPr lang="en-US" baseline="0" dirty="0" smtClean="0"/>
-              <a:t>Which leads us right into an Introduction to </a:t>
-            </a:r>
-            <a:r>
-              <a:rPr lang="en-US" baseline="0" smtClean="0"/>
-              <a:t>Agile Analysis.</a:t>
-            </a:r>
-            <a:endParaRPr lang="en-US" baseline="0" dirty="0" smtClean="0"/>
+              <a:t>Which leads us right into an Introduction to Agile Analysis.</a:t>
+            </a:r>
           </a:p>
           <a:p>
             <a:pPr eaLnBrk="1" hangingPunct="1">
@@ -1582,6 +1622,11 @@
         </p:txBody>
       </p:sp>
     </p:spTree>
+    <p:extLst>
+      <p:ext uri="{BB962C8B-B14F-4D97-AF65-F5344CB8AC3E}">
+        <p14:creationId xmlns:p14="http://schemas.microsoft.com/office/powerpoint/2010/main" val="40124996"/>
+      </p:ext>
+    </p:extLst>
   </p:cSld>
   <p:clrMapOvr>
     <a:masterClrMapping/>
@@ -1740,7 +1785,7 @@
         <p:spPr/>
         <p:txBody>
           <a:bodyPr>
-            <a:normAutofit/>
+            <a:normAutofit fontScale="85000" lnSpcReduction="20000"/>
           </a:bodyPr>
           <a:lstStyle/>
           <a:p>
@@ -2074,6 +2119,11 @@
         </p:txBody>
       </p:sp>
     </p:spTree>
+    <p:extLst>
+      <p:ext uri="{BB962C8B-B14F-4D97-AF65-F5344CB8AC3E}">
+        <p14:creationId xmlns:p14="http://schemas.microsoft.com/office/powerpoint/2010/main" val="1611645930"/>
+      </p:ext>
+    </p:extLst>
   </p:cSld>
   <p:clrMapOvr>
     <a:masterClrMapping/>
@@ -2335,6 +2385,11 @@
         </p:txBody>
       </p:sp>
     </p:spTree>
+    <p:extLst>
+      <p:ext uri="{BB962C8B-B14F-4D97-AF65-F5344CB8AC3E}">
+        <p14:creationId xmlns:p14="http://schemas.microsoft.com/office/powerpoint/2010/main" val="1937322590"/>
+      </p:ext>
+    </p:extLst>
   </p:cSld>
   <p:clrMapOvr>
     <a:masterClrMapping/>
@@ -2442,6 +2497,11 @@
         </p:txBody>
       </p:sp>
     </p:spTree>
+    <p:extLst>
+      <p:ext uri="{BB962C8B-B14F-4D97-AF65-F5344CB8AC3E}">
+        <p14:creationId xmlns:p14="http://schemas.microsoft.com/office/powerpoint/2010/main" val="433714316"/>
+      </p:ext>
+    </p:extLst>
   </p:cSld>
   <p:clrMapOvr>
     <a:masterClrMapping/>
@@ -2678,6 +2738,11 @@
         </p:txBody>
       </p:sp>
     </p:spTree>
+    <p:extLst>
+      <p:ext uri="{BB962C8B-B14F-4D97-AF65-F5344CB8AC3E}">
+        <p14:creationId xmlns:p14="http://schemas.microsoft.com/office/powerpoint/2010/main" val="1745187497"/>
+      </p:ext>
+    </p:extLst>
   </p:cSld>
   <p:clrMapOvr>
     <a:masterClrMapping/>
@@ -2904,6 +2969,11 @@
         </p:txBody>
       </p:sp>
     </p:spTree>
+    <p:extLst>
+      <p:ext uri="{BB962C8B-B14F-4D97-AF65-F5344CB8AC3E}">
+        <p14:creationId xmlns:p14="http://schemas.microsoft.com/office/powerpoint/2010/main" val="537920112"/>
+      </p:ext>
+    </p:extLst>
   </p:cSld>
   <p:clrMapOvr>
     <a:masterClrMapping/>
@@ -3010,6 +3080,11 @@
         </p:txBody>
       </p:sp>
     </p:spTree>
+    <p:extLst>
+      <p:ext uri="{BB962C8B-B14F-4D97-AF65-F5344CB8AC3E}">
+        <p14:creationId xmlns:p14="http://schemas.microsoft.com/office/powerpoint/2010/main" val="2064652161"/>
+      </p:ext>
+    </p:extLst>
   </p:cSld>
   <p:clrMapOvr>
     <a:masterClrMapping/>
@@ -3144,7 +3219,7 @@
   <p:clrMapOvr>
     <a:masterClrMapping/>
   </p:clrMapOvr>
-  <p:transition xmlns:p14="http://schemas.microsoft.com/office/powerpoint/2010/main" spd="med">
+  <p:transition spd="med">
     <p:fade/>
   </p:transition>
 </p:sldLayout>
@@ -3172,7 +3247,7 @@
   <p:clrMapOvr>
     <a:masterClrMapping/>
   </p:clrMapOvr>
-  <p:transition xmlns:p14="http://schemas.microsoft.com/office/powerpoint/2010/main" spd="med">
+  <p:transition spd="med">
     <p:fade/>
   </p:transition>
 </p:sldLayout>
@@ -3382,7 +3457,7 @@
   <p:clrMapOvr>
     <a:masterClrMapping/>
   </p:clrMapOvr>
-  <p:transition xmlns:p14="http://schemas.microsoft.com/office/powerpoint/2010/main" spd="med">
+  <p:transition spd="med">
     <p:fade/>
   </p:transition>
 </p:sldLayout>
@@ -3573,7 +3648,7 @@
   <p:clrMapOvr>
     <a:masterClrMapping/>
   </p:clrMapOvr>
-  <p:transition xmlns:p14="http://schemas.microsoft.com/office/powerpoint/2010/main" spd="med">
+  <p:transition spd="med">
     <p:fade/>
   </p:transition>
 </p:sldLayout>
@@ -3676,7 +3751,7 @@
   <p:clrMapOvr>
     <a:masterClrMapping/>
   </p:clrMapOvr>
-  <p:transition xmlns:p14="http://schemas.microsoft.com/office/powerpoint/2010/main" spd="med">
+  <p:transition spd="med">
     <p:fade/>
   </p:transition>
 </p:sldLayout>
@@ -3789,7 +3864,7 @@
   <p:clrMapOvr>
     <a:masterClrMapping/>
   </p:clrMapOvr>
-  <p:transition xmlns:p14="http://schemas.microsoft.com/office/powerpoint/2010/main" spd="med">
+  <p:transition spd="med">
     <p:fade/>
   </p:transition>
 </p:sldLayout>
@@ -3959,13 +4034,13 @@
   <p:clrMapOvr>
     <a:masterClrMapping/>
   </p:clrMapOvr>
-  <p:transition xmlns:p14="http://schemas.microsoft.com/office/powerpoint/2010/main" spd="med">
+  <p:transition spd="med">
     <p:fade/>
   </p:transition>
   <p:timing>
     <p:tnLst>
       <p:par>
-        <p:cTn xmlns:p14="http://schemas.microsoft.com/office/powerpoint/2010/main" id="1" dur="indefinite" restart="never" nodeType="tmRoot"/>
+        <p:cTn id="1" dur="indefinite" restart="never" nodeType="tmRoot"/>
       </p:par>
     </p:tnLst>
   </p:timing>
@@ -4668,7 +4743,7 @@
   <p:clrMapOvr>
     <a:masterClrMapping/>
   </p:clrMapOvr>
-  <p:transition xmlns:p14="http://schemas.microsoft.com/office/powerpoint/2010/main" spd="med">
+  <p:transition spd="med">
     <p:fade/>
   </p:transition>
 </p:sldLayout>
@@ -4859,13 +4934,13 @@
   <p:clrMapOvr>
     <a:masterClrMapping/>
   </p:clrMapOvr>
-  <p:transition xmlns:p14="http://schemas.microsoft.com/office/powerpoint/2010/main" spd="med">
+  <p:transition spd="med">
     <p:fade/>
   </p:transition>
   <p:timing>
     <p:tnLst>
       <p:par>
-        <p:cTn xmlns:p14="http://schemas.microsoft.com/office/powerpoint/2010/main" id="1" dur="indefinite" restart="never" nodeType="tmRoot"/>
+        <p:cTn id="1" dur="indefinite" restart="never" nodeType="tmRoot"/>
       </p:par>
     </p:tnLst>
   </p:timing>
@@ -5274,13 +5349,13 @@
   <p:clrMapOvr>
     <a:masterClrMapping/>
   </p:clrMapOvr>
-  <p:transition xmlns:p14="http://schemas.microsoft.com/office/powerpoint/2010/main" spd="med">
+  <p:transition spd="med">
     <p:fade/>
   </p:transition>
   <p:timing>
     <p:tnLst>
       <p:par>
-        <p:cTn xmlns:p14="http://schemas.microsoft.com/office/powerpoint/2010/main" id="1" dur="indefinite" restart="never" nodeType="tmRoot"/>
+        <p:cTn id="1" dur="indefinite" restart="never" nodeType="tmRoot"/>
       </p:par>
     </p:tnLst>
   </p:timing>
@@ -5641,13 +5716,13 @@
   <p:clrMapOvr>
     <a:masterClrMapping/>
   </p:clrMapOvr>
-  <p:transition xmlns:p14="http://schemas.microsoft.com/office/powerpoint/2010/main" spd="med">
+  <p:transition spd="med">
     <p:fade/>
   </p:transition>
   <p:timing>
     <p:tnLst>
       <p:par>
-        <p:cTn xmlns:p14="http://schemas.microsoft.com/office/powerpoint/2010/main" id="1" dur="indefinite" restart="never" nodeType="tmRoot"/>
+        <p:cTn id="1" dur="indefinite" restart="never" nodeType="tmRoot"/>
       </p:par>
     </p:tnLst>
   </p:timing>
@@ -5704,13 +5779,13 @@
   <p:clrMapOvr>
     <a:masterClrMapping/>
   </p:clrMapOvr>
-  <p:transition xmlns:p14="http://schemas.microsoft.com/office/powerpoint/2010/main" spd="med">
+  <p:transition spd="med">
     <p:fade/>
   </p:transition>
   <p:timing>
     <p:tnLst>
       <p:par>
-        <p:cTn xmlns:p14="http://schemas.microsoft.com/office/powerpoint/2010/main" id="1" dur="indefinite" restart="never" nodeType="tmRoot"/>
+        <p:cTn id="1" dur="indefinite" restart="never" nodeType="tmRoot"/>
       </p:par>
     </p:tnLst>
   </p:timing>
@@ -5744,13 +5819,13 @@
   <p:clrMapOvr>
     <a:masterClrMapping/>
   </p:clrMapOvr>
-  <p:transition xmlns:p14="http://schemas.microsoft.com/office/powerpoint/2010/main" spd="med">
+  <p:transition spd="med">
     <p:fade/>
   </p:transition>
   <p:timing>
     <p:tnLst>
       <p:par>
-        <p:cTn xmlns:p14="http://schemas.microsoft.com/office/powerpoint/2010/main" id="1" dur="indefinite" restart="never" nodeType="tmRoot"/>
+        <p:cTn id="1" dur="indefinite" restart="never" nodeType="tmRoot"/>
       </p:par>
     </p:tnLst>
   </p:timing>
@@ -6631,7 +6706,7 @@
   <p:clrMapOvr>
     <a:masterClrMapping/>
   </p:clrMapOvr>
-  <p:transition xmlns:p14="http://schemas.microsoft.com/office/powerpoint/2010/main" spd="med">
+  <p:transition spd="med">
     <p:fade/>
   </p:transition>
   <p:hf hdr="0" ftr="0" dt="0"/>
@@ -6700,11 +6775,11 @@
   <p:clrMapOvr>
     <a:masterClrMapping/>
   </p:clrMapOvr>
-  <p:transition xmlns:p14="http://schemas.microsoft.com/office/powerpoint/2010/main"/>
+  <p:transition/>
   <p:timing>
     <p:tnLst>
       <p:par>
-        <p:cTn xmlns:p14="http://schemas.microsoft.com/office/powerpoint/2010/main" id="1" dur="indefinite" restart="never" nodeType="tmRoot"/>
+        <p:cTn id="1" dur="indefinite" restart="never" nodeType="tmRoot"/>
       </p:par>
     </p:tnLst>
   </p:timing>
@@ -6859,7 +6934,7 @@
   <p:clrMapOvr>
     <a:masterClrMapping/>
   </p:clrMapOvr>
-  <p:transition xmlns:p14="http://schemas.microsoft.com/office/powerpoint/2010/main" spd="med">
+  <p:transition spd="med">
     <p:fade/>
   </p:transition>
 </p:sldLayout>
@@ -7228,13 +7303,13 @@
   <p:clrMapOvr>
     <a:masterClrMapping/>
   </p:clrMapOvr>
-  <p:transition xmlns:p14="http://schemas.microsoft.com/office/powerpoint/2010/main" spd="med">
+  <p:transition spd="med">
     <p:fade/>
   </p:transition>
   <p:timing>
     <p:tnLst>
       <p:par>
-        <p:cTn xmlns:p14="http://schemas.microsoft.com/office/powerpoint/2010/main" id="1" dur="indefinite" restart="never" nodeType="tmRoot"/>
+        <p:cTn id="1" dur="indefinite" restart="never" nodeType="tmRoot"/>
       </p:par>
     </p:tnLst>
   </p:timing>
@@ -7643,13 +7718,13 @@
   <p:clrMapOvr>
     <a:masterClrMapping/>
   </p:clrMapOvr>
-  <p:transition xmlns:p14="http://schemas.microsoft.com/office/powerpoint/2010/main" spd="med">
+  <p:transition spd="med">
     <p:fade/>
   </p:transition>
   <p:timing>
     <p:tnLst>
       <p:par>
-        <p:cTn xmlns:p14="http://schemas.microsoft.com/office/powerpoint/2010/main" id="1" dur="indefinite" restart="never" nodeType="tmRoot"/>
+        <p:cTn id="1" dur="indefinite" restart="never" nodeType="tmRoot"/>
       </p:par>
     </p:tnLst>
   </p:timing>
@@ -8010,13 +8085,13 @@
   <p:clrMapOvr>
     <a:masterClrMapping/>
   </p:clrMapOvr>
-  <p:transition xmlns:p14="http://schemas.microsoft.com/office/powerpoint/2010/main" spd="med">
+  <p:transition spd="med">
     <p:fade/>
   </p:transition>
   <p:timing>
     <p:tnLst>
       <p:par>
-        <p:cTn xmlns:p14="http://schemas.microsoft.com/office/powerpoint/2010/main" id="1" dur="indefinite" restart="never" nodeType="tmRoot"/>
+        <p:cTn id="1" dur="indefinite" restart="never" nodeType="tmRoot"/>
       </p:par>
     </p:tnLst>
   </p:timing>
@@ -8073,13 +8148,13 @@
   <p:clrMapOvr>
     <a:masterClrMapping/>
   </p:clrMapOvr>
-  <p:transition xmlns:p14="http://schemas.microsoft.com/office/powerpoint/2010/main" spd="med">
+  <p:transition spd="med">
     <p:fade/>
   </p:transition>
   <p:timing>
     <p:tnLst>
       <p:par>
-        <p:cTn xmlns:p14="http://schemas.microsoft.com/office/powerpoint/2010/main" id="1" dur="indefinite" restart="never" nodeType="tmRoot"/>
+        <p:cTn id="1" dur="indefinite" restart="never" nodeType="tmRoot"/>
       </p:par>
     </p:tnLst>
   </p:timing>
@@ -8113,13 +8188,13 @@
   <p:clrMapOvr>
     <a:masterClrMapping/>
   </p:clrMapOvr>
-  <p:transition xmlns:p14="http://schemas.microsoft.com/office/powerpoint/2010/main" spd="med">
+  <p:transition spd="med">
     <p:fade/>
   </p:transition>
   <p:timing>
     <p:tnLst>
       <p:par>
-        <p:cTn xmlns:p14="http://schemas.microsoft.com/office/powerpoint/2010/main" id="1" dur="indefinite" restart="never" nodeType="tmRoot"/>
+        <p:cTn id="1" dur="indefinite" restart="never" nodeType="tmRoot"/>
       </p:par>
     </p:tnLst>
   </p:timing>
@@ -8540,7 +8615,7 @@
   <p:clrMapOvr>
     <a:masterClrMapping/>
   </p:clrMapOvr>
-  <p:transition xmlns:p14="http://schemas.microsoft.com/office/powerpoint/2010/main" spd="med">
+  <p:transition spd="med">
     <p:fade/>
   </p:transition>
 </p:sldLayout>
@@ -9023,11 +9098,11 @@
   <p:clrMapOvr>
     <a:masterClrMapping/>
   </p:clrMapOvr>
-  <p:transition xmlns:p14="http://schemas.microsoft.com/office/powerpoint/2010/main"/>
+  <p:transition/>
   <p:timing>
     <p:tnLst>
       <p:par>
-        <p:cTn xmlns:p14="http://schemas.microsoft.com/office/powerpoint/2010/main" id="1" dur="indefinite" restart="never" nodeType="tmRoot"/>
+        <p:cTn id="1" dur="indefinite" restart="never" nodeType="tmRoot"/>
       </p:par>
     </p:tnLst>
   </p:timing>
@@ -9182,7 +9257,7 @@
   <p:clrMapOvr>
     <a:masterClrMapping/>
   </p:clrMapOvr>
-  <p:transition xmlns:p14="http://schemas.microsoft.com/office/powerpoint/2010/main" spd="med">
+  <p:transition spd="med">
     <p:fade/>
   </p:transition>
 </p:sldLayout>
@@ -9295,13 +9370,13 @@
   <p:clrMapOvr>
     <a:masterClrMapping/>
   </p:clrMapOvr>
-  <p:transition xmlns:p14="http://schemas.microsoft.com/office/powerpoint/2010/main" spd="med">
+  <p:transition spd="med">
     <p:fade/>
   </p:transition>
   <p:timing>
     <p:tnLst>
       <p:par>
-        <p:cTn xmlns:p14="http://schemas.microsoft.com/office/powerpoint/2010/main" id="1" dur="indefinite" restart="never" nodeType="tmRoot"/>
+        <p:cTn id="1" dur="indefinite" restart="never" nodeType="tmRoot"/>
       </p:par>
     </p:tnLst>
   </p:timing>
@@ -9427,7 +9502,7 @@
   <p:clrMapOvr>
     <a:masterClrMapping/>
   </p:clrMapOvr>
-  <p:transition xmlns:p14="http://schemas.microsoft.com/office/powerpoint/2010/main" spd="med">
+  <p:transition spd="med">
     <p:fade/>
   </p:transition>
 </p:sldLayout>
@@ -9648,7 +9723,7 @@
   <p:clrMapOvr>
     <a:masterClrMapping/>
   </p:clrMapOvr>
-  <p:transition xmlns:p14="http://schemas.microsoft.com/office/powerpoint/2010/main" spd="med">
+  <p:transition spd="med">
     <p:fade/>
   </p:transition>
 </p:sldLayout>
@@ -10008,7 +10083,7 @@
   <p:clrMapOvr>
     <a:masterClrMapping/>
   </p:clrMapOvr>
-  <p:transition xmlns:p14="http://schemas.microsoft.com/office/powerpoint/2010/main" spd="med">
+  <p:transition spd="med">
     <p:fade/>
   </p:transition>
 </p:sldLayout>
@@ -10059,7 +10134,7 @@
   <p:clrMapOvr>
     <a:masterClrMapping/>
   </p:clrMapOvr>
-  <p:transition xmlns:p14="http://schemas.microsoft.com/office/powerpoint/2010/main" spd="med">
+  <p:transition spd="med">
     <p:fade/>
   </p:transition>
 </p:sldLayout>
@@ -10358,13 +10433,13 @@
     <p:sldLayoutId id="2147483689" r:id="rId17"/>
     <p:sldLayoutId id="2147483690" r:id="rId18"/>
   </p:sldLayoutIdLst>
-  <p:transition xmlns:p14="http://schemas.microsoft.com/office/powerpoint/2010/main" spd="med">
+  <p:transition spd="med">
     <p:fade/>
   </p:transition>
   <p:timing>
     <p:tnLst>
       <p:par>
-        <p:cTn xmlns:p14="http://schemas.microsoft.com/office/powerpoint/2010/main" id="1" dur="indefinite" restart="never" nodeType="tmRoot"/>
+        <p:cTn id="1" dur="indefinite" restart="never" nodeType="tmRoot"/>
       </p:par>
     </p:tnLst>
   </p:timing>
@@ -10990,13 +11065,13 @@
     <p:sldLayoutId id="2147483714" r:id="rId12"/>
     <p:sldLayoutId id="2147483715" r:id="rId13"/>
   </p:sldLayoutIdLst>
-  <p:transition xmlns:p14="http://schemas.microsoft.com/office/powerpoint/2010/main" spd="med">
+  <p:transition spd="med">
     <p:fade/>
   </p:transition>
   <p:timing>
     <p:tnLst>
       <p:par>
-        <p:cTn xmlns:p14="http://schemas.microsoft.com/office/powerpoint/2010/main" id="1" dur="indefinite" restart="never" nodeType="tmRoot"/>
+        <p:cTn id="1" dur="indefinite" restart="never" nodeType="tmRoot"/>
       </p:par>
     </p:tnLst>
   </p:timing>
@@ -11454,13 +11529,13 @@
     <p:sldLayoutId id="2147483728" r:id="rId12"/>
     <p:sldLayoutId id="2147483729" r:id="rId13"/>
   </p:sldLayoutIdLst>
-  <p:transition xmlns:p14="http://schemas.microsoft.com/office/powerpoint/2010/main" spd="med">
+  <p:transition spd="med">
     <p:fade/>
   </p:transition>
   <p:timing>
     <p:tnLst>
       <p:par>
-        <p:cTn xmlns:p14="http://schemas.microsoft.com/office/powerpoint/2010/main" id="1" dur="indefinite" restart="never" nodeType="tmRoot"/>
+        <p:cTn id="1" dur="indefinite" restart="never" nodeType="tmRoot"/>
       </p:par>
     </p:tnLst>
   </p:timing>
@@ -11811,14 +11886,14 @@
           </a:ln>
           <a:extLst>
             <a:ext uri="{909E8E84-426E-40dd-AFC4-6F175D3DCCD1}">
-              <a14:hiddenFill xmlns:a14="http://schemas.microsoft.com/office/drawing/2010/main">
+              <a14:hiddenFill xmlns:a14="http://schemas.microsoft.com/office/drawing/2010/main" xmlns="">
                 <a:solidFill>
                   <a:srgbClr val="FFFFFF"/>
                 </a:solidFill>
               </a14:hiddenFill>
             </a:ext>
             <a:ext uri="{91240B29-F687-4f45-9708-019B960494DF}">
-              <a14:hiddenLine xmlns:a14="http://schemas.microsoft.com/office/drawing/2010/main" w="9525">
+              <a14:hiddenLine xmlns:a14="http://schemas.microsoft.com/office/drawing/2010/main" xmlns="" w="9525">
                 <a:solidFill>
                   <a:srgbClr val="000000"/>
                 </a:solidFill>
@@ -11940,13 +12015,13 @@
   <p:clrMapOvr>
     <a:masterClrMapping/>
   </p:clrMapOvr>
-  <p:transition xmlns:p14="http://schemas.microsoft.com/office/powerpoint/2010/main" spd="med">
+  <p:transition spd="med">
     <p:fade/>
   </p:transition>
   <p:timing>
     <p:tnLst>
       <p:par>
-        <p:cTn xmlns:p14="http://schemas.microsoft.com/office/powerpoint/2010/main" id="1" dur="indefinite" restart="never" nodeType="tmRoot"/>
+        <p:cTn id="1" dur="indefinite" restart="never" nodeType="tmRoot"/>
       </p:par>
     </p:tnLst>
   </p:timing>
@@ -12039,13 +12114,13 @@
   <p:clrMapOvr>
     <a:masterClrMapping/>
   </p:clrMapOvr>
-  <p:transition xmlns:p14="http://schemas.microsoft.com/office/powerpoint/2010/main" spd="med">
+  <p:transition spd="med">
     <p:fade/>
   </p:transition>
   <p:timing>
     <p:tnLst>
       <p:par>
-        <p:cTn xmlns:p14="http://schemas.microsoft.com/office/powerpoint/2010/main" id="1" dur="indefinite" restart="never" nodeType="tmRoot"/>
+        <p:cTn id="1" dur="indefinite" restart="never" nodeType="tmRoot"/>
       </p:par>
     </p:tnLst>
   </p:timing>
@@ -12137,13 +12212,13 @@
   <p:clrMapOvr>
     <a:masterClrMapping/>
   </p:clrMapOvr>
-  <p:transition xmlns:p14="http://schemas.microsoft.com/office/powerpoint/2010/main" spd="med">
+  <p:transition spd="med">
     <p:fade/>
   </p:transition>
   <p:timing>
     <p:tnLst>
       <p:par>
-        <p:cTn xmlns:p14="http://schemas.microsoft.com/office/powerpoint/2010/main" id="1" dur="indefinite" restart="never" nodeType="tmRoot"/>
+        <p:cTn id="1" dur="indefinite" restart="never" nodeType="tmRoot"/>
       </p:par>
     </p:tnLst>
   </p:timing>
@@ -12209,13 +12284,13 @@
   <p:clrMapOvr>
     <a:masterClrMapping/>
   </p:clrMapOvr>
-  <p:transition xmlns:p14="http://schemas.microsoft.com/office/powerpoint/2010/main" spd="med">
+  <p:transition spd="med">
     <p:fade/>
   </p:transition>
   <p:timing>
     <p:tnLst>
       <p:par>
-        <p:cTn xmlns:p14="http://schemas.microsoft.com/office/powerpoint/2010/main" id="1" dur="indefinite" restart="never" nodeType="tmRoot"/>
+        <p:cTn id="1" dur="indefinite" restart="never" nodeType="tmRoot"/>
       </p:par>
     </p:tnLst>
   </p:timing>
@@ -12281,13 +12356,13 @@
   <p:clrMapOvr>
     <a:masterClrMapping/>
   </p:clrMapOvr>
-  <p:transition xmlns:p14="http://schemas.microsoft.com/office/powerpoint/2010/main" spd="med">
+  <p:transition spd="med">
     <p:fade/>
   </p:transition>
   <p:timing>
     <p:tnLst>
       <p:par>
-        <p:cTn xmlns:p14="http://schemas.microsoft.com/office/powerpoint/2010/main" id="1" dur="indefinite" restart="never" nodeType="tmRoot"/>
+        <p:cTn id="1" dur="indefinite" restart="never" nodeType="tmRoot"/>
       </p:par>
     </p:tnLst>
   </p:timing>
@@ -12353,13 +12428,13 @@
   <p:clrMapOvr>
     <a:masterClrMapping/>
   </p:clrMapOvr>
-  <p:transition xmlns:p14="http://schemas.microsoft.com/office/powerpoint/2010/main" spd="med">
+  <p:transition spd="med">
     <p:fade/>
   </p:transition>
   <p:timing>
     <p:tnLst>
       <p:par>
-        <p:cTn xmlns:p14="http://schemas.microsoft.com/office/powerpoint/2010/main" id="1" dur="indefinite" restart="never" nodeType="tmRoot"/>
+        <p:cTn id="1" dur="indefinite" restart="never" nodeType="tmRoot"/>
       </p:par>
     </p:tnLst>
   </p:timing>
@@ -12425,13 +12500,13 @@
   <p:clrMapOvr>
     <a:masterClrMapping/>
   </p:clrMapOvr>
-  <p:transition xmlns:p14="http://schemas.microsoft.com/office/powerpoint/2010/main" spd="med">
+  <p:transition spd="med">
     <p:fade/>
   </p:transition>
   <p:timing>
     <p:tnLst>
       <p:par>
-        <p:cTn xmlns:p14="http://schemas.microsoft.com/office/powerpoint/2010/main" id="1" dur="indefinite" restart="never" nodeType="tmRoot"/>
+        <p:cTn id="1" dur="indefinite" restart="never" nodeType="tmRoot"/>
       </p:par>
     </p:tnLst>
   </p:timing>
@@ -12468,7 +12543,7 @@
         <p:spPr/>
         <p:txBody>
           <a:bodyPr>
-            <a:normAutofit fontScale="90000"/>
+            <a:normAutofit/>
           </a:bodyPr>
           <a:lstStyle/>
           <a:p>
@@ -12515,13 +12590,13 @@
   <p:clrMapOvr>
     <a:masterClrMapping/>
   </p:clrMapOvr>
-  <p:transition xmlns:p14="http://schemas.microsoft.com/office/powerpoint/2010/main" spd="med">
+  <p:transition spd="med">
     <p:fade/>
   </p:transition>
   <p:timing>
     <p:tnLst>
       <p:par>
-        <p:cTn xmlns:p14="http://schemas.microsoft.com/office/powerpoint/2010/main" id="1" dur="indefinite" restart="never" nodeType="tmRoot"/>
+        <p:cTn id="1" dur="indefinite" restart="never" nodeType="tmRoot"/>
       </p:par>
     </p:tnLst>
   </p:timing>
@@ -12578,11 +12653,11 @@
   <p:clrMapOvr>
     <a:masterClrMapping/>
   </p:clrMapOvr>
-  <p:transition xmlns:p14="http://schemas.microsoft.com/office/powerpoint/2010/main"/>
+  <p:transition/>
   <p:timing>
     <p:tnLst>
       <p:par>
-        <p:cTn xmlns:p14="http://schemas.microsoft.com/office/powerpoint/2010/main" id="1" dur="indefinite" restart="never" nodeType="tmRoot"/>
+        <p:cTn id="1" dur="indefinite" restart="never" nodeType="tmRoot"/>
       </p:par>
     </p:tnLst>
   </p:timing>
@@ -12674,13 +12749,13 @@
   <p:clrMapOvr>
     <a:masterClrMapping/>
   </p:clrMapOvr>
-  <p:transition xmlns:p14="http://schemas.microsoft.com/office/powerpoint/2010/main" spd="med">
+  <p:transition spd="med">
     <p:fade/>
   </p:transition>
   <p:timing>
     <p:tnLst>
       <p:par>
-        <p:cTn xmlns:p14="http://schemas.microsoft.com/office/powerpoint/2010/main" id="1" dur="indefinite" restart="never" nodeType="tmRoot"/>
+        <p:cTn id="1" dur="indefinite" restart="never" nodeType="tmRoot"/>
       </p:par>
     </p:tnLst>
   </p:timing>
@@ -12823,13 +12898,13 @@
   <p:clrMapOvr>
     <a:masterClrMapping/>
   </p:clrMapOvr>
-  <p:transition xmlns:p14="http://schemas.microsoft.com/office/powerpoint/2010/main" spd="med">
+  <p:transition spd="med">
     <p:fade/>
   </p:transition>
   <p:timing>
     <p:tnLst>
       <p:par>
-        <p:cTn xmlns:p14="http://schemas.microsoft.com/office/powerpoint/2010/main" id="1" dur="indefinite" restart="never" nodeType="tmRoot"/>
+        <p:cTn id="1" dur="indefinite" restart="never" nodeType="tmRoot"/>
       </p:par>
     </p:tnLst>
   </p:timing>
@@ -12941,7 +13016,7 @@
         </p:blipFill>
         <p:spPr>
           <a:xfrm>
-            <a:off x="3505200" y="3352800"/>
+            <a:off x="3505200" y="2687144"/>
             <a:ext cx="5334000" cy="3087053"/>
           </a:xfrm>
           <a:prstGeom prst="rect">
@@ -12954,13 +13029,13 @@
   <p:clrMapOvr>
     <a:masterClrMapping/>
   </p:clrMapOvr>
-  <p:transition xmlns:p14="http://schemas.microsoft.com/office/powerpoint/2010/main" spd="med">
+  <p:transition spd="med">
     <p:fade/>
   </p:transition>
   <p:timing>
     <p:tnLst>
       <p:par>
-        <p:cTn xmlns:p14="http://schemas.microsoft.com/office/powerpoint/2010/main" id="1" dur="indefinite" restart="never" nodeType="tmRoot"/>
+        <p:cTn id="1" dur="indefinite" restart="never" nodeType="tmRoot"/>
       </p:par>
     </p:tnLst>
   </p:timing>
@@ -13094,7 +13169,7 @@
         </p:blipFill>
         <p:spPr>
           <a:xfrm>
-            <a:off x="6967992" y="2895600"/>
+            <a:off x="7010400" y="2421397"/>
             <a:ext cx="1825089" cy="3352800"/>
           </a:xfrm>
           <a:prstGeom prst="rect">
@@ -13107,13 +13182,13 @@
   <p:clrMapOvr>
     <a:masterClrMapping/>
   </p:clrMapOvr>
-  <p:transition xmlns:p14="http://schemas.microsoft.com/office/powerpoint/2010/main" spd="med">
+  <p:transition spd="med">
     <p:fade/>
   </p:transition>
   <p:timing>
     <p:tnLst>
       <p:par>
-        <p:cTn xmlns:p14="http://schemas.microsoft.com/office/powerpoint/2010/main" id="1" dur="indefinite" restart="never" nodeType="tmRoot">
+        <p:cTn id="1" dur="indefinite" restart="never" nodeType="tmRoot">
           <p:childTnLst>
             <p:seq concurrent="1" nextAc="seek">
               <p:cTn id="2" dur="indefinite" nodeType="mainSeq">
@@ -13517,13 +13592,13 @@
   <p:clrMapOvr>
     <a:masterClrMapping/>
   </p:clrMapOvr>
-  <p:transition xmlns:p14="http://schemas.microsoft.com/office/powerpoint/2010/main" spd="med">
+  <p:transition spd="med">
     <p:fade/>
   </p:transition>
   <p:timing>
     <p:tnLst>
       <p:par>
-        <p:cTn xmlns:p14="http://schemas.microsoft.com/office/powerpoint/2010/main" id="1" dur="indefinite" restart="never" nodeType="tmRoot"/>
+        <p:cTn id="1" dur="indefinite" restart="never" nodeType="tmRoot"/>
       </p:par>
     </p:tnLst>
   </p:timing>
@@ -13615,13 +13690,13 @@
   <p:clrMapOvr>
     <a:masterClrMapping/>
   </p:clrMapOvr>
-  <p:transition xmlns:p14="http://schemas.microsoft.com/office/powerpoint/2010/main" spd="med">
+  <p:transition spd="med">
     <p:fade/>
   </p:transition>
   <p:timing>
     <p:tnLst>
       <p:par>
-        <p:cTn xmlns:p14="http://schemas.microsoft.com/office/powerpoint/2010/main" id="1" dur="indefinite" restart="never" nodeType="tmRoot"/>
+        <p:cTn id="1" dur="indefinite" restart="never" nodeType="tmRoot"/>
       </p:par>
     </p:tnLst>
   </p:timing>
@@ -13824,13 +13899,13 @@
   <p:clrMapOvr>
     <a:masterClrMapping/>
   </p:clrMapOvr>
-  <p:transition xmlns:p14="http://schemas.microsoft.com/office/powerpoint/2010/main" spd="med">
+  <p:transition spd="med">
     <p:fade/>
   </p:transition>
   <p:timing>
     <p:tnLst>
       <p:par>
-        <p:cTn xmlns:p14="http://schemas.microsoft.com/office/powerpoint/2010/main" id="1" dur="indefinite" restart="never" nodeType="tmRoot">
+        <p:cTn id="1" dur="indefinite" restart="never" nodeType="tmRoot">
           <p:childTnLst>
             <p:seq concurrent="1" nextAc="seek">
               <p:cTn id="2" dur="indefinite" nodeType="mainSeq">
@@ -14104,13 +14179,13 @@
   <p:clrMapOvr>
     <a:masterClrMapping/>
   </p:clrMapOvr>
-  <p:transition xmlns:p14="http://schemas.microsoft.com/office/powerpoint/2010/main" spd="med">
+  <p:transition spd="med">
     <p:fade/>
   </p:transition>
   <p:timing>
     <p:tnLst>
       <p:par>
-        <p:cTn xmlns:p14="http://schemas.microsoft.com/office/powerpoint/2010/main" id="1" dur="indefinite" restart="never" nodeType="tmRoot"/>
+        <p:cTn id="1" dur="indefinite" restart="never" nodeType="tmRoot"/>
       </p:par>
     </p:tnLst>
   </p:timing>

</xml_diff>

<commit_message>
Initial cleanup of the three courses we already 'released'. Added more content (code, outline, etc.) to the Dev course.
</commit_message>
<xml_diff>
--- a/Agile Business Analysis/00-Opening.pptx
+++ b/Agile Business Analysis/00-Opening.pptx
@@ -337,7 +337,7 @@
             <a:fld id="{3645A85B-5EE2-224D-892B-EBDEE738041D}" type="datetime1">
               <a:rPr lang="en-US"/>
               <a:pPr/>
-              <a:t>10/5/15</a:t>
+              <a:t>12/21/15</a:t>
             </a:fld>
             <a:endParaRPr lang="en-US"/>
           </a:p>
@@ -580,7 +580,7 @@
             <a:fld id="{357A0049-9727-1C49-9F90-B954D42273FA}" type="datetime1">
               <a:rPr lang="en-US"/>
               <a:pPr/>
-              <a:t>10/5/15</a:t>
+              <a:t>12/21/15</a:t>
             </a:fld>
             <a:endParaRPr lang="en-US"/>
           </a:p>
@@ -965,12 +965,6 @@
               </a:spcAft>
               <a:defRPr/>
             </a:pPr>
-            <a:r>
-              <a:rPr lang="en-US" dirty="0" smtClean="0"/>
-              <a:t>Hello, and welcome to The Origins of Agile Software Development, a module in Agile Fundamentals. This module is brought to you by ThoughtWorks Studios, makers of Mingle, Go, and Twist.</a:t>
-            </a:r>
-          </a:p>
-          <a:p>
             <a:endParaRPr lang="en-US" dirty="0"/>
           </a:p>
         </p:txBody>
@@ -1785,7 +1779,7 @@
         <p:spPr/>
         <p:txBody>
           <a:bodyPr>
-            <a:normAutofit fontScale="85000" lnSpcReduction="20000"/>
+            <a:normAutofit fontScale="92500" lnSpcReduction="20000"/>
           </a:bodyPr>
           <a:lstStyle/>
           <a:p>
@@ -1908,61 +1902,6 @@
               </a:rPr>
               <a:t> as the benchmarks are questionable but they are an indication of the levels of improvement you can get across the time, effort and quality axis that are possible. </a:t>
             </a:r>
-          </a:p>
-          <a:p>
-            <a:pPr lvl="0" eaLnBrk="1" hangingPunct="1"/>
-            <a:endParaRPr lang="en-US" sz="1200" b="1" kern="0" dirty="0" smtClean="0">
-              <a:solidFill>
-                <a:srgbClr val="FFFFFF"/>
-              </a:solidFill>
-              <a:latin typeface="Marydale"/>
-              <a:ea typeface="ＭＳ Ｐゴシック"/>
-              <a:cs typeface="ＭＳ Ｐゴシック"/>
-            </a:endParaRPr>
-          </a:p>
-          <a:p>
-            <a:pPr lvl="0" eaLnBrk="1" hangingPunct="1"/>
-            <a:endParaRPr lang="en-US" sz="1200" b="1" kern="0" dirty="0" smtClean="0">
-              <a:solidFill>
-                <a:srgbClr val="FFFFFF"/>
-              </a:solidFill>
-              <a:latin typeface="Marydale"/>
-              <a:ea typeface="ＭＳ Ｐゴシック"/>
-              <a:cs typeface="ＭＳ Ｐゴシック"/>
-            </a:endParaRPr>
-          </a:p>
-          <a:p>
-            <a:pPr lvl="0" eaLnBrk="1" hangingPunct="1"/>
-            <a:r>
-              <a:rPr lang="en-US" sz="1200" b="1" kern="0" dirty="0" smtClean="0">
-                <a:solidFill>
-                  <a:srgbClr val="FFFFFF"/>
-                </a:solidFill>
-                <a:latin typeface="Marydale"/>
-                <a:ea typeface="ＭＳ Ｐゴシック"/>
-                <a:cs typeface="ＭＳ Ｐゴシック"/>
-              </a:rPr>
-              <a:t>Note: </a:t>
-            </a:r>
-            <a:r>
-              <a:rPr lang="en-US" sz="1200" kern="0" dirty="0" smtClean="0">
-                <a:solidFill>
-                  <a:srgbClr val="FFFFFF"/>
-                </a:solidFill>
-                <a:latin typeface="Marydale"/>
-                <a:ea typeface="ＭＳ Ｐゴシック"/>
-                <a:cs typeface="ＭＳ Ｐゴシック"/>
-              </a:rPr>
-              <a:t>you need to be conversant with this report or have it to hand to be able to talk to these metrics.</a:t>
-            </a:r>
-            <a:endParaRPr lang="en-US" sz="1200" kern="0" dirty="0" smtClean="0">
-              <a:solidFill>
-                <a:srgbClr val="FFFFFF"/>
-              </a:solidFill>
-              <a:latin typeface="Arial" charset="0"/>
-              <a:ea typeface="ＭＳ Ｐゴシック" charset="-128"/>
-              <a:cs typeface="ＭＳ Ｐゴシック" charset="-128"/>
-            </a:endParaRPr>
           </a:p>
           <a:p>
             <a:pPr marL="219392" indent="-219392">
@@ -2082,15 +2021,19 @@
                 <a:latin typeface="Georgia"/>
                 <a:cs typeface="Georgia"/>
               </a:rPr>
-              <a:t>Reduced defects by more than 60%</a:t>
-            </a:r>
-          </a:p>
-          <a:p>
-            <a:r>
-              <a:rPr lang="en-US" baseline="0" dirty="0" smtClean="0"/>
-              <a:t>re than 2 minutes – quick background, relevant experience</a:t>
-            </a:r>
-            <a:endParaRPr lang="en-US" dirty="0"/>
+              <a:t>Reduced defects by more than 60</a:t>
+            </a:r>
+            <a:r>
+              <a:rPr lang="en-US" dirty="0" smtClean="0">
+                <a:latin typeface="Georgia"/>
+                <a:cs typeface="Georgia"/>
+              </a:rPr>
+              <a:t>%</a:t>
+            </a:r>
+            <a:endParaRPr lang="en-US" dirty="0" smtClean="0">
+              <a:latin typeface="Georgia"/>
+              <a:cs typeface="Georgia"/>
+            </a:endParaRPr>
           </a:p>
         </p:txBody>
       </p:sp>
@@ -11886,14 +11829,14 @@
           </a:ln>
           <a:extLst>
             <a:ext uri="{909E8E84-426E-40dd-AFC4-6F175D3DCCD1}">
-              <a14:hiddenFill xmlns:a14="http://schemas.microsoft.com/office/drawing/2010/main" xmlns="">
+              <a14:hiddenFill xmlns="" xmlns:a14="http://schemas.microsoft.com/office/drawing/2010/main">
                 <a:solidFill>
                   <a:srgbClr val="FFFFFF"/>
                 </a:solidFill>
               </a14:hiddenFill>
             </a:ext>
             <a:ext uri="{91240B29-F687-4f45-9708-019B960494DF}">
-              <a14:hiddenLine xmlns:a14="http://schemas.microsoft.com/office/drawing/2010/main" xmlns="" w="9525">
+              <a14:hiddenLine xmlns="" xmlns:a14="http://schemas.microsoft.com/office/drawing/2010/main" w="9525">
                 <a:solidFill>
                   <a:srgbClr val="000000"/>
                 </a:solidFill>

</xml_diff>